<commit_message>
revised README file and class_1 presentation
</commit_message>
<xml_diff>
--- a/class_1/class1.pptx
+++ b/class_1/class1.pptx
@@ -24,11 +24,6 @@
     <p:sldId id="268" r:id="rId18"/>
     <p:sldId id="269" r:id="rId19"/>
     <p:sldId id="270" r:id="rId20"/>
-    <p:sldId id="271" r:id="rId21"/>
-    <p:sldId id="272" r:id="rId22"/>
-    <p:sldId id="273" r:id="rId23"/>
-    <p:sldId id="274" r:id="rId24"/>
-    <p:sldId id="275" r:id="rId25"/>
   </p:sldIdLst>
   <p:sldSz cx="9144000" cy="6858000" type="screen4x3"/>
   <p:notesSz cx="6858000" cy="9144000"/>
@@ -5335,11 +5330,7 @@
           <a:p>
             <a:r>
               <a:rPr lang="en-US" dirty="0" smtClean="0"/>
-              <a:t>AWK</a:t>
-            </a:r>
-            <a:r>
-              <a:rPr lang="en-US" dirty="0" smtClean="0"/>
-              <a:t>: when to use it, why people use it so much, why its so important for GMT, and how to use it! (most likely next time)</a:t>
+              <a:t>AWK: when to use it, why people use it so much, why its so important for GMT, and how to use it! (most likely next time)</a:t>
             </a:r>
           </a:p>
           <a:p>
@@ -5348,404 +5339,6 @@
           </a:p>
           <a:p>
             <a:endParaRPr lang="en-US" dirty="0"/>
-          </a:p>
-        </p:txBody>
-      </p:sp>
-    </p:spTree>
-  </p:cSld>
-  <p:clrMapOvr>
-    <a:masterClrMapping/>
-  </p:clrMapOvr>
-</p:sld>
-</file>
-
-<file path=ppt/slides/slide20.xml><?xml version="1.0" encoding="utf-8"?>
-<p:sld xmlns:a="http://schemas.openxmlformats.org/drawingml/2006/main" xmlns:r="http://schemas.openxmlformats.org/officeDocument/2006/relationships" xmlns:p="http://schemas.openxmlformats.org/presentationml/2006/main">
-  <p:cSld>
-    <p:spTree>
-      <p:nvGrpSpPr>
-        <p:cNvPr id="1" name=""/>
-        <p:cNvGrpSpPr/>
-        <p:nvPr/>
-      </p:nvGrpSpPr>
-      <p:grpSpPr>
-        <a:xfrm>
-          <a:off x="0" y="0"/>
-          <a:ext cx="0" cy="0"/>
-          <a:chOff x="0" y="0"/>
-          <a:chExt cx="0" cy="0"/>
-        </a:xfrm>
-      </p:grpSpPr>
-      <p:sp>
-        <p:nvSpPr>
-          <p:cNvPr id="2" name="Title 1"/>
-          <p:cNvSpPr>
-            <a:spLocks noGrp="1"/>
-          </p:cNvSpPr>
-          <p:nvPr>
-            <p:ph type="title"/>
-          </p:nvPr>
-        </p:nvSpPr>
-        <p:spPr>
-          <a:xfrm>
-            <a:off x="0" y="0"/>
-            <a:ext cx="8229600" cy="914400"/>
-          </a:xfrm>
-        </p:spPr>
-        <p:txBody>
-          <a:bodyPr/>
-          <a:lstStyle/>
-          <a:p>
-            <a:pPr algn="l"/>
-            <a:r>
-              <a:rPr lang="en-US" dirty="0" smtClean="0">
-                <a:solidFill>
-                  <a:srgbClr val="FFFF00"/>
-                </a:solidFill>
-              </a:rPr>
-              <a:t>AWK</a:t>
-            </a:r>
-            <a:endParaRPr lang="en-US" dirty="0">
-              <a:solidFill>
-                <a:srgbClr val="FFFF00"/>
-              </a:solidFill>
-            </a:endParaRPr>
-          </a:p>
-        </p:txBody>
-      </p:sp>
-      <p:sp>
-        <p:nvSpPr>
-          <p:cNvPr id="3" name="Content Placeholder 2"/>
-          <p:cNvSpPr>
-            <a:spLocks noGrp="1"/>
-          </p:cNvSpPr>
-          <p:nvPr>
-            <p:ph idx="1"/>
-          </p:nvPr>
-        </p:nvSpPr>
-        <p:spPr>
-          <a:xfrm>
-            <a:off x="152400" y="914400"/>
-            <a:ext cx="8763000" cy="5562600"/>
-          </a:xfrm>
-        </p:spPr>
-        <p:txBody>
-          <a:bodyPr/>
-          <a:lstStyle/>
-          <a:p>
-            <a:endParaRPr lang="en-US" dirty="0" smtClean="0"/>
-          </a:p>
-        </p:txBody>
-      </p:sp>
-    </p:spTree>
-  </p:cSld>
-  <p:clrMapOvr>
-    <a:masterClrMapping/>
-  </p:clrMapOvr>
-</p:sld>
-</file>
-
-<file path=ppt/slides/slide21.xml><?xml version="1.0" encoding="utf-8"?>
-<p:sld xmlns:a="http://schemas.openxmlformats.org/drawingml/2006/main" xmlns:r="http://schemas.openxmlformats.org/officeDocument/2006/relationships" xmlns:p="http://schemas.openxmlformats.org/presentationml/2006/main">
-  <p:cSld>
-    <p:spTree>
-      <p:nvGrpSpPr>
-        <p:cNvPr id="1" name=""/>
-        <p:cNvGrpSpPr/>
-        <p:nvPr/>
-      </p:nvGrpSpPr>
-      <p:grpSpPr>
-        <a:xfrm>
-          <a:off x="0" y="0"/>
-          <a:ext cx="0" cy="0"/>
-          <a:chOff x="0" y="0"/>
-          <a:chExt cx="0" cy="0"/>
-        </a:xfrm>
-      </p:grpSpPr>
-      <p:sp>
-        <p:nvSpPr>
-          <p:cNvPr id="2" name="Title 1"/>
-          <p:cNvSpPr>
-            <a:spLocks noGrp="1"/>
-          </p:cNvSpPr>
-          <p:nvPr>
-            <p:ph type="title"/>
-          </p:nvPr>
-        </p:nvSpPr>
-        <p:spPr>
-          <a:xfrm>
-            <a:off x="0" y="0"/>
-            <a:ext cx="8229600" cy="914400"/>
-          </a:xfrm>
-        </p:spPr>
-        <p:txBody>
-          <a:bodyPr/>
-          <a:lstStyle/>
-          <a:p>
-            <a:pPr algn="l"/>
-            <a:endParaRPr lang="en-US" dirty="0">
-              <a:solidFill>
-                <a:srgbClr val="FFFF00"/>
-              </a:solidFill>
-            </a:endParaRPr>
-          </a:p>
-        </p:txBody>
-      </p:sp>
-      <p:sp>
-        <p:nvSpPr>
-          <p:cNvPr id="3" name="Content Placeholder 2"/>
-          <p:cNvSpPr>
-            <a:spLocks noGrp="1"/>
-          </p:cNvSpPr>
-          <p:nvPr>
-            <p:ph idx="1"/>
-          </p:nvPr>
-        </p:nvSpPr>
-        <p:spPr>
-          <a:xfrm>
-            <a:off x="152400" y="914400"/>
-            <a:ext cx="8763000" cy="5562600"/>
-          </a:xfrm>
-        </p:spPr>
-        <p:txBody>
-          <a:bodyPr/>
-          <a:lstStyle/>
-          <a:p>
-            <a:endParaRPr lang="en-US" dirty="0" smtClean="0"/>
-          </a:p>
-        </p:txBody>
-      </p:sp>
-    </p:spTree>
-  </p:cSld>
-  <p:clrMapOvr>
-    <a:masterClrMapping/>
-  </p:clrMapOvr>
-</p:sld>
-</file>
-
-<file path=ppt/slides/slide22.xml><?xml version="1.0" encoding="utf-8"?>
-<p:sld xmlns:a="http://schemas.openxmlformats.org/drawingml/2006/main" xmlns:r="http://schemas.openxmlformats.org/officeDocument/2006/relationships" xmlns:p="http://schemas.openxmlformats.org/presentationml/2006/main">
-  <p:cSld>
-    <p:spTree>
-      <p:nvGrpSpPr>
-        <p:cNvPr id="1" name=""/>
-        <p:cNvGrpSpPr/>
-        <p:nvPr/>
-      </p:nvGrpSpPr>
-      <p:grpSpPr>
-        <a:xfrm>
-          <a:off x="0" y="0"/>
-          <a:ext cx="0" cy="0"/>
-          <a:chOff x="0" y="0"/>
-          <a:chExt cx="0" cy="0"/>
-        </a:xfrm>
-      </p:grpSpPr>
-      <p:sp>
-        <p:nvSpPr>
-          <p:cNvPr id="2" name="Title 1"/>
-          <p:cNvSpPr>
-            <a:spLocks noGrp="1"/>
-          </p:cNvSpPr>
-          <p:nvPr>
-            <p:ph type="title"/>
-          </p:nvPr>
-        </p:nvSpPr>
-        <p:spPr>
-          <a:xfrm>
-            <a:off x="0" y="0"/>
-            <a:ext cx="8229600" cy="914400"/>
-          </a:xfrm>
-        </p:spPr>
-        <p:txBody>
-          <a:bodyPr/>
-          <a:lstStyle/>
-          <a:p>
-            <a:pPr algn="l"/>
-            <a:endParaRPr lang="en-US" dirty="0">
-              <a:solidFill>
-                <a:srgbClr val="FFFF00"/>
-              </a:solidFill>
-            </a:endParaRPr>
-          </a:p>
-        </p:txBody>
-      </p:sp>
-      <p:sp>
-        <p:nvSpPr>
-          <p:cNvPr id="3" name="Content Placeholder 2"/>
-          <p:cNvSpPr>
-            <a:spLocks noGrp="1"/>
-          </p:cNvSpPr>
-          <p:nvPr>
-            <p:ph idx="1"/>
-          </p:nvPr>
-        </p:nvSpPr>
-        <p:spPr>
-          <a:xfrm>
-            <a:off x="152400" y="914400"/>
-            <a:ext cx="8763000" cy="5562600"/>
-          </a:xfrm>
-        </p:spPr>
-        <p:txBody>
-          <a:bodyPr/>
-          <a:lstStyle/>
-          <a:p>
-            <a:endParaRPr lang="en-US" dirty="0" smtClean="0"/>
-          </a:p>
-        </p:txBody>
-      </p:sp>
-    </p:spTree>
-  </p:cSld>
-  <p:clrMapOvr>
-    <a:masterClrMapping/>
-  </p:clrMapOvr>
-</p:sld>
-</file>
-
-<file path=ppt/slides/slide23.xml><?xml version="1.0" encoding="utf-8"?>
-<p:sld xmlns:a="http://schemas.openxmlformats.org/drawingml/2006/main" xmlns:r="http://schemas.openxmlformats.org/officeDocument/2006/relationships" xmlns:p="http://schemas.openxmlformats.org/presentationml/2006/main">
-  <p:cSld>
-    <p:spTree>
-      <p:nvGrpSpPr>
-        <p:cNvPr id="1" name=""/>
-        <p:cNvGrpSpPr/>
-        <p:nvPr/>
-      </p:nvGrpSpPr>
-      <p:grpSpPr>
-        <a:xfrm>
-          <a:off x="0" y="0"/>
-          <a:ext cx="0" cy="0"/>
-          <a:chOff x="0" y="0"/>
-          <a:chExt cx="0" cy="0"/>
-        </a:xfrm>
-      </p:grpSpPr>
-      <p:sp>
-        <p:nvSpPr>
-          <p:cNvPr id="2" name="Title 1"/>
-          <p:cNvSpPr>
-            <a:spLocks noGrp="1"/>
-          </p:cNvSpPr>
-          <p:nvPr>
-            <p:ph type="title"/>
-          </p:nvPr>
-        </p:nvSpPr>
-        <p:spPr>
-          <a:xfrm>
-            <a:off x="0" y="0"/>
-            <a:ext cx="8229600" cy="914400"/>
-          </a:xfrm>
-        </p:spPr>
-        <p:txBody>
-          <a:bodyPr/>
-          <a:lstStyle/>
-          <a:p>
-            <a:pPr algn="l"/>
-            <a:endParaRPr lang="en-US" dirty="0">
-              <a:solidFill>
-                <a:srgbClr val="FFFF00"/>
-              </a:solidFill>
-            </a:endParaRPr>
-          </a:p>
-        </p:txBody>
-      </p:sp>
-      <p:sp>
-        <p:nvSpPr>
-          <p:cNvPr id="3" name="Content Placeholder 2"/>
-          <p:cNvSpPr>
-            <a:spLocks noGrp="1"/>
-          </p:cNvSpPr>
-          <p:nvPr>
-            <p:ph idx="1"/>
-          </p:nvPr>
-        </p:nvSpPr>
-        <p:spPr>
-          <a:xfrm>
-            <a:off x="152400" y="914400"/>
-            <a:ext cx="8763000" cy="5562600"/>
-          </a:xfrm>
-        </p:spPr>
-        <p:txBody>
-          <a:bodyPr/>
-          <a:lstStyle/>
-          <a:p>
-            <a:endParaRPr lang="en-US" dirty="0" smtClean="0"/>
-          </a:p>
-        </p:txBody>
-      </p:sp>
-    </p:spTree>
-  </p:cSld>
-  <p:clrMapOvr>
-    <a:masterClrMapping/>
-  </p:clrMapOvr>
-</p:sld>
-</file>
-
-<file path=ppt/slides/slide24.xml><?xml version="1.0" encoding="utf-8"?>
-<p:sld xmlns:a="http://schemas.openxmlformats.org/drawingml/2006/main" xmlns:r="http://schemas.openxmlformats.org/officeDocument/2006/relationships" xmlns:p="http://schemas.openxmlformats.org/presentationml/2006/main">
-  <p:cSld>
-    <p:spTree>
-      <p:nvGrpSpPr>
-        <p:cNvPr id="1" name=""/>
-        <p:cNvGrpSpPr/>
-        <p:nvPr/>
-      </p:nvGrpSpPr>
-      <p:grpSpPr>
-        <a:xfrm>
-          <a:off x="0" y="0"/>
-          <a:ext cx="0" cy="0"/>
-          <a:chOff x="0" y="0"/>
-          <a:chExt cx="0" cy="0"/>
-        </a:xfrm>
-      </p:grpSpPr>
-      <p:sp>
-        <p:nvSpPr>
-          <p:cNvPr id="2" name="Title 1"/>
-          <p:cNvSpPr>
-            <a:spLocks noGrp="1"/>
-          </p:cNvSpPr>
-          <p:nvPr>
-            <p:ph type="title"/>
-          </p:nvPr>
-        </p:nvSpPr>
-        <p:spPr>
-          <a:xfrm>
-            <a:off x="0" y="0"/>
-            <a:ext cx="8229600" cy="914400"/>
-          </a:xfrm>
-        </p:spPr>
-        <p:txBody>
-          <a:bodyPr/>
-          <a:lstStyle/>
-          <a:p>
-            <a:pPr algn="l"/>
-            <a:endParaRPr lang="en-US" dirty="0">
-              <a:solidFill>
-                <a:srgbClr val="FFFF00"/>
-              </a:solidFill>
-            </a:endParaRPr>
-          </a:p>
-        </p:txBody>
-      </p:sp>
-      <p:sp>
-        <p:nvSpPr>
-          <p:cNvPr id="3" name="Content Placeholder 2"/>
-          <p:cNvSpPr>
-            <a:spLocks noGrp="1"/>
-          </p:cNvSpPr>
-          <p:nvPr>
-            <p:ph idx="1"/>
-          </p:nvPr>
-        </p:nvSpPr>
-        <p:spPr>
-          <a:xfrm>
-            <a:off x="152400" y="914400"/>
-            <a:ext cx="8763000" cy="5562600"/>
-          </a:xfrm>
-        </p:spPr>
-        <p:txBody>
-          <a:bodyPr/>
-          <a:lstStyle/>
-          <a:p>
-            <a:endParaRPr lang="en-US" dirty="0" smtClean="0"/>
           </a:p>
         </p:txBody>
       </p:sp>
@@ -5885,7 +5478,17 @@
                   <a:srgbClr val="FFFF00"/>
                 </a:solidFill>
               </a:rPr>
-              <a:t>life </a:t>
+              <a:t>life easier:</a:t>
+            </a:r>
+            <a:r>
+              <a:rPr lang="en-US" dirty="0" smtClean="0"/>
+              <a:t> when you are managing data files and don’t want to waste time doing it “manually”</a:t>
+            </a:r>
+          </a:p>
+          <a:p>
+            <a:r>
+              <a:rPr lang="en-US" dirty="0" smtClean="0"/>
+              <a:t>If you do </a:t>
             </a:r>
             <a:r>
               <a:rPr lang="en-US" dirty="0" smtClean="0">
@@ -5893,104 +5496,66 @@
                   <a:srgbClr val="FFFF00"/>
                 </a:solidFill>
               </a:rPr>
-              <a:t>easier:</a:t>
+              <a:t>repetitive processing</a:t>
+            </a:r>
+            <a:r>
+              <a:rPr lang="en-US" dirty="0" smtClean="0"/>
+              <a:t> (don’t do it one-by-one)</a:t>
+            </a:r>
+          </a:p>
+          <a:p>
+            <a:r>
+              <a:rPr lang="en-US" dirty="0" smtClean="0"/>
+              <a:t>If you </a:t>
+            </a:r>
+            <a:r>
+              <a:rPr lang="en-US" dirty="0" smtClean="0">
+                <a:solidFill>
+                  <a:srgbClr val="FFFF00"/>
+                </a:solidFill>
+              </a:rPr>
+              <a:t>run many models</a:t>
+            </a:r>
+            <a:r>
+              <a:rPr lang="en-US" dirty="0" smtClean="0"/>
+              <a:t> with different parameters, or even when you want something to </a:t>
+            </a:r>
+            <a:r>
+              <a:rPr lang="en-US" dirty="0" smtClean="0">
+                <a:solidFill>
+                  <a:srgbClr val="FFFF00"/>
+                </a:solidFill>
+              </a:rPr>
+              <a:t>run many times</a:t>
+            </a:r>
+            <a:r>
+              <a:rPr lang="en-US" dirty="0" smtClean="0"/>
+              <a:t>.</a:t>
+            </a:r>
+          </a:p>
+          <a:p>
+            <a:r>
+              <a:rPr lang="en-US" dirty="0" smtClean="0"/>
+              <a:t>When your work requires to </a:t>
+            </a:r>
+            <a:r>
+              <a:rPr lang="en-US" dirty="0" smtClean="0">
+                <a:solidFill>
+                  <a:srgbClr val="FFFF00"/>
+                </a:solidFill>
+              </a:rPr>
+              <a:t>integrate different languages:</a:t>
             </a:r>
             <a:r>
               <a:rPr lang="en-US" dirty="0" smtClean="0"/>
               <a:t> </a:t>
             </a:r>
-            <a:r>
-              <a:rPr lang="en-US" dirty="0" smtClean="0"/>
-              <a:t>when you are managing data files and don’t want to waste time doing it “manually”</a:t>
-            </a:r>
-          </a:p>
-          <a:p>
-            <a:r>
-              <a:rPr lang="en-US" dirty="0" smtClean="0"/>
-              <a:t>If you do </a:t>
-            </a:r>
-            <a:r>
-              <a:rPr lang="en-US" dirty="0" smtClean="0">
-                <a:solidFill>
-                  <a:srgbClr val="FFFF00"/>
-                </a:solidFill>
-              </a:rPr>
-              <a:t>repetitive processing</a:t>
-            </a:r>
-            <a:r>
-              <a:rPr lang="en-US" dirty="0" smtClean="0"/>
-              <a:t> (don’t do it one-by-one)</a:t>
-            </a:r>
-          </a:p>
-          <a:p>
-            <a:r>
-              <a:rPr lang="en-US" dirty="0" smtClean="0"/>
-              <a:t>If you </a:t>
-            </a:r>
-            <a:r>
-              <a:rPr lang="en-US" dirty="0" smtClean="0">
-                <a:solidFill>
-                  <a:srgbClr val="FFFF00"/>
-                </a:solidFill>
-              </a:rPr>
-              <a:t>run many models</a:t>
-            </a:r>
-            <a:r>
-              <a:rPr lang="en-US" dirty="0" smtClean="0"/>
-              <a:t> with different parameters, or even when you want something to </a:t>
-            </a:r>
-            <a:r>
-              <a:rPr lang="en-US" dirty="0" smtClean="0">
-                <a:solidFill>
-                  <a:srgbClr val="FFFF00"/>
-                </a:solidFill>
-              </a:rPr>
-              <a:t>run many times</a:t>
-            </a:r>
-            <a:r>
-              <a:rPr lang="en-US" dirty="0" smtClean="0"/>
-              <a:t>.</a:t>
-            </a:r>
-          </a:p>
-          <a:p>
-            <a:r>
-              <a:rPr lang="en-US" dirty="0" smtClean="0"/>
-              <a:t>When your work requires to </a:t>
-            </a:r>
-            <a:r>
-              <a:rPr lang="en-US" dirty="0" smtClean="0">
-                <a:solidFill>
-                  <a:srgbClr val="FFFF00"/>
-                </a:solidFill>
-              </a:rPr>
-              <a:t>integrate different </a:t>
-            </a:r>
-            <a:r>
-              <a:rPr lang="en-US" dirty="0" smtClean="0">
-                <a:solidFill>
-                  <a:srgbClr val="FFFF00"/>
-                </a:solidFill>
-              </a:rPr>
-              <a:t>languages:</a:t>
-            </a:r>
-            <a:r>
-              <a:rPr lang="en-US" dirty="0" smtClean="0"/>
-              <a:t> </a:t>
-            </a:r>
           </a:p>
           <a:p>
             <a:pPr lvl="1"/>
             <a:r>
               <a:rPr lang="en-US" dirty="0" smtClean="0"/>
-              <a:t>you </a:t>
-            </a:r>
-            <a:r>
-              <a:rPr lang="en-US" dirty="0" smtClean="0"/>
-              <a:t>need to do something that first runs a FORTRAN program and then something in C++ or you want to run a program and at the end get a plot made with GMT.</a:t>
-            </a:r>
-            <a:r>
-              <a:rPr lang="en-US" dirty="0" smtClean="0"/>
-              <a:t>.</a:t>
+              <a:t>you need to do something that first runs a FORTRAN program and then something in C++ or you want to run a program and at the end get a plot made with GMT..</a:t>
             </a:r>
             <a:endParaRPr lang="en-US" dirty="0"/>
           </a:p>
@@ -7446,19 +7011,7 @@
             </a:pPr>
             <a:r>
               <a:rPr lang="en-US" dirty="0" smtClean="0"/>
-              <a:t>Run it (just type the name of the </a:t>
-            </a:r>
-            <a:r>
-              <a:rPr lang="en-US" dirty="0" smtClean="0"/>
-              <a:t>file. </a:t>
-            </a:r>
-            <a:r>
-              <a:rPr lang="en-US" dirty="0" smtClean="0"/>
-              <a:t>in some OS’s you have to </a:t>
-            </a:r>
-            <a:r>
-              <a:rPr lang="en-US" dirty="0" smtClean="0"/>
-              <a:t>type</a:t>
+              <a:t>Run it (just type the name of the file. in some OS’s you have to type</a:t>
             </a:r>
           </a:p>
           <a:p>
@@ -7467,11 +7020,7 @@
             </a:pPr>
             <a:r>
               <a:rPr lang="en-US" dirty="0" smtClean="0"/>
-              <a:t>“</a:t>
-            </a:r>
-            <a:r>
-              <a:rPr lang="en-US" dirty="0" smtClean="0"/>
-              <a:t>./filename” to run it).</a:t>
+              <a:t>“./filename” to run it).</a:t>
             </a:r>
           </a:p>
           <a:p>

</xml_diff>